<commit_message>
Update PPT: add architecture and flow diagrams
</commit_message>
<xml_diff>
--- a/VoiceAgent_Hackathon_Presentation.pptx
+++ b/VoiceAgent_Hackathon_Presentation.pptx
@@ -18,6 +18,8 @@
     <p:sldId id="266" r:id="rId17"/>
     <p:sldId id="267" r:id="rId18"/>
     <p:sldId id="268" r:id="rId19"/>
+    <p:sldId id="269" r:id="rId20"/>
+    <p:sldId id="270" r:id="rId21"/>
   </p:sldIdLst>
   <p:sldSz cx="9144000" cy="6858000" type="screen4x3"/>
   <p:notesSz cx="6858000" cy="9144000"/>
@@ -3176,7 +3178,7 @@
           <a:lstStyle/>
           <a:p>
             <a:r>
-              <a:t>Live Demo Flow</a:t>
+              <a:t>No-Hallucination Strategy</a:t>
             </a:r>
           </a:p>
         </p:txBody>
@@ -3201,39 +3203,39 @@
               <a:defRPr sz="2400"/>
             </a:pPr>
             <a:r>
-              <a:t>Judge asks a real policy question via mic</a:t>
-            </a:r>
-          </a:p>
-          <a:p>
-            <a:pPr>
-              <a:defRPr sz="2400"/>
-            </a:pPr>
-            <a:r>
-              <a:t>System transcribes, searches, and answers instantly</a:t>
-            </a:r>
-          </a:p>
-          <a:p>
-            <a:pPr>
-              <a:defRPr sz="2400"/>
-            </a:pPr>
-            <a:r>
-              <a:t>Policy snippet shown as source</a:t>
-            </a:r>
-          </a:p>
-          <a:p>
-            <a:pPr>
-              <a:defRPr sz="2400"/>
-            </a:pPr>
-            <a:r>
-              <a:t>Voice output reads answer</a:t>
-            </a:r>
-          </a:p>
-          <a:p>
-            <a:pPr>
-              <a:defRPr sz="2400"/>
-            </a:pPr>
-            <a:r>
-              <a:t>End-to-end, judge-friendly experience</a:t>
+              <a:t>Strict grounding: answers only from indexed documents</a:t>
+            </a:r>
+          </a:p>
+          <a:p>
+            <a:pPr>
+              <a:defRPr sz="2400"/>
+            </a:pPr>
+            <a:r>
+              <a:t>RAG pipeline enforces document context</a:t>
+            </a:r>
+          </a:p>
+          <a:p>
+            <a:pPr>
+              <a:defRPr sz="2400"/>
+            </a:pPr>
+            <a:r>
+              <a:t>No open-ended LLM responses</a:t>
+            </a:r>
+          </a:p>
+          <a:p>
+            <a:pPr>
+              <a:defRPr sz="2400"/>
+            </a:pPr>
+            <a:r>
+              <a:t>Policy snippets shown as evidence</a:t>
+            </a:r>
+          </a:p>
+          <a:p>
+            <a:pPr>
+              <a:defRPr sz="2400"/>
+            </a:pPr>
+            <a:r>
+              <a:t>User trust through transparency</a:t>
             </a:r>
           </a:p>
         </p:txBody>
@@ -3272,7 +3274,7 @@
           <a:lstStyle/>
           <a:p>
             <a:r>
-              <a:t>Scalability &amp; Enterprise Readiness</a:t>
+              <a:t>Tech Stack</a:t>
             </a:r>
           </a:p>
         </p:txBody>
@@ -3297,39 +3299,39 @@
               <a:defRPr sz="2400"/>
             </a:pPr>
             <a:r>
-              <a:t>Modular microservices architecture</a:t>
-            </a:r>
-          </a:p>
-          <a:p>
-            <a:pPr>
-              <a:defRPr sz="2400"/>
-            </a:pPr>
-            <a:r>
-              <a:t>Easy to add new policy documents</a:t>
-            </a:r>
-          </a:p>
-          <a:p>
-            <a:pPr>
-              <a:defRPr sz="2400"/>
-            </a:pPr>
-            <a:r>
-              <a:t>Scalable vector search (FAISS)</a:t>
-            </a:r>
-          </a:p>
-          <a:p>
-            <a:pPr>
-              <a:defRPr sz="2400"/>
-            </a:pPr>
-            <a:r>
-              <a:t>Secure, compliant data handling</a:t>
-            </a:r>
-          </a:p>
-          <a:p>
-            <a:pPr>
-              <a:defRPr sz="2400"/>
-            </a:pPr>
-            <a:r>
-              <a:t>Ready for cloud or on-prem deployment</a:t>
+              <a:t>Frontend: HTML, JS, Web Speech API</a:t>
+            </a:r>
+          </a:p>
+          <a:p>
+            <a:pPr>
+              <a:defRPr sz="2400"/>
+            </a:pPr>
+            <a:r>
+              <a:t>Backend: FastAPI (Python), Flask (optional)</a:t>
+            </a:r>
+          </a:p>
+          <a:p>
+            <a:pPr>
+              <a:defRPr sz="2400"/>
+            </a:pPr>
+            <a:r>
+              <a:t>AI: Google ADK, Gemini models</a:t>
+            </a:r>
+          </a:p>
+          <a:p>
+            <a:pPr>
+              <a:defRPr sz="2400"/>
+            </a:pPr>
+            <a:r>
+              <a:t>Vector DB: FAISS</a:t>
+            </a:r>
+          </a:p>
+          <a:p>
+            <a:pPr>
+              <a:defRPr sz="2400"/>
+            </a:pPr>
+            <a:r>
+              <a:t>Infra: Local or cloud deployable</a:t>
             </a:r>
           </a:p>
         </p:txBody>
@@ -3368,7 +3370,7 @@
           <a:lstStyle/>
           <a:p>
             <a:r>
-              <a:t>Future Enhancements</a:t>
+              <a:t>Live Demo Flow</a:t>
             </a:r>
           </a:p>
         </p:txBody>
@@ -3393,39 +3395,39 @@
               <a:defRPr sz="2400"/>
             </a:pPr>
             <a:r>
-              <a:t>Multilingual voice support</a:t>
-            </a:r>
-          </a:p>
-          <a:p>
-            <a:pPr>
-              <a:defRPr sz="2400"/>
-            </a:pPr>
-            <a:r>
-              <a:t>Integration with live insurance systems</a:t>
-            </a:r>
-          </a:p>
-          <a:p>
-            <a:pPr>
-              <a:defRPr sz="2400"/>
-            </a:pPr>
-            <a:r>
-              <a:t>Advanced analytics and reporting</a:t>
-            </a:r>
-          </a:p>
-          <a:p>
-            <a:pPr>
-              <a:defRPr sz="2400"/>
-            </a:pPr>
-            <a:r>
-              <a:t>Mobile app version</a:t>
-            </a:r>
-          </a:p>
-          <a:p>
-            <a:pPr>
-              <a:defRPr sz="2400"/>
-            </a:pPr>
-            <a:r>
-              <a:t>Continuous LLM improvement</a:t>
+              <a:t>Judge asks a real policy question via mic</a:t>
+            </a:r>
+          </a:p>
+          <a:p>
+            <a:pPr>
+              <a:defRPr sz="2400"/>
+            </a:pPr>
+            <a:r>
+              <a:t>System transcribes, searches, and answers instantly</a:t>
+            </a:r>
+          </a:p>
+          <a:p>
+            <a:pPr>
+              <a:defRPr sz="2400"/>
+            </a:pPr>
+            <a:r>
+              <a:t>Policy snippet shown as source</a:t>
+            </a:r>
+          </a:p>
+          <a:p>
+            <a:pPr>
+              <a:defRPr sz="2400"/>
+            </a:pPr>
+            <a:r>
+              <a:t>Voice output reads answer</a:t>
+            </a:r>
+          </a:p>
+          <a:p>
+            <a:pPr>
+              <a:defRPr sz="2400"/>
+            </a:pPr>
+            <a:r>
+              <a:t>End-to-end, judge-friendly experience</a:t>
             </a:r>
           </a:p>
         </p:txBody>
@@ -3464,6 +3466,198 @@
           <a:lstStyle/>
           <a:p>
             <a:r>
+              <a:t>Scalability &amp; Enterprise Readiness</a:t>
+            </a:r>
+          </a:p>
+        </p:txBody>
+      </p:sp>
+      <p:sp>
+        <p:nvSpPr>
+          <p:cNvPr id="3" name="Content Placeholder 2"/>
+          <p:cNvSpPr>
+            <a:spLocks noGrp="1"/>
+          </p:cNvSpPr>
+          <p:nvPr>
+            <p:ph idx="1"/>
+          </p:nvPr>
+        </p:nvSpPr>
+        <p:spPr/>
+        <p:txBody>
+          <a:bodyPr/>
+          <a:lstStyle/>
+          <a:p/>
+          <a:p>
+            <a:pPr>
+              <a:defRPr sz="2400"/>
+            </a:pPr>
+            <a:r>
+              <a:t>Modular microservices architecture</a:t>
+            </a:r>
+          </a:p>
+          <a:p>
+            <a:pPr>
+              <a:defRPr sz="2400"/>
+            </a:pPr>
+            <a:r>
+              <a:t>Easy to add new policy documents</a:t>
+            </a:r>
+          </a:p>
+          <a:p>
+            <a:pPr>
+              <a:defRPr sz="2400"/>
+            </a:pPr>
+            <a:r>
+              <a:t>Scalable vector search (FAISS)</a:t>
+            </a:r>
+          </a:p>
+          <a:p>
+            <a:pPr>
+              <a:defRPr sz="2400"/>
+            </a:pPr>
+            <a:r>
+              <a:t>Secure, compliant data handling</a:t>
+            </a:r>
+          </a:p>
+          <a:p>
+            <a:pPr>
+              <a:defRPr sz="2400"/>
+            </a:pPr>
+            <a:r>
+              <a:t>Ready for cloud or on-prem deployment</a:t>
+            </a:r>
+          </a:p>
+        </p:txBody>
+      </p:sp>
+    </p:spTree>
+  </p:cSld>
+  <p:clrMapOvr>
+    <a:masterClrMapping/>
+  </p:clrMapOvr>
+</p:sld>
+</file>
+
+<file path=ppt/slides/slide14.xml><?xml version="1.0" encoding="utf-8"?>
+<p:sld xmlns:a="http://schemas.openxmlformats.org/drawingml/2006/main" xmlns:p="http://schemas.openxmlformats.org/presentationml/2006/main" xmlns:r="http://schemas.openxmlformats.org/officeDocument/2006/relationships">
+  <p:cSld>
+    <p:spTree>
+      <p:nvGrpSpPr>
+        <p:cNvPr id="1" name=""/>
+        <p:cNvGrpSpPr/>
+        <p:nvPr/>
+      </p:nvGrpSpPr>
+      <p:grpSpPr/>
+      <p:sp>
+        <p:nvSpPr>
+          <p:cNvPr id="2" name="Title 1"/>
+          <p:cNvSpPr>
+            <a:spLocks noGrp="1"/>
+          </p:cNvSpPr>
+          <p:nvPr>
+            <p:ph type="title"/>
+          </p:nvPr>
+        </p:nvSpPr>
+        <p:spPr/>
+        <p:txBody>
+          <a:bodyPr/>
+          <a:lstStyle/>
+          <a:p>
+            <a:r>
+              <a:t>Future Enhancements</a:t>
+            </a:r>
+          </a:p>
+        </p:txBody>
+      </p:sp>
+      <p:sp>
+        <p:nvSpPr>
+          <p:cNvPr id="3" name="Content Placeholder 2"/>
+          <p:cNvSpPr>
+            <a:spLocks noGrp="1"/>
+          </p:cNvSpPr>
+          <p:nvPr>
+            <p:ph idx="1"/>
+          </p:nvPr>
+        </p:nvSpPr>
+        <p:spPr/>
+        <p:txBody>
+          <a:bodyPr/>
+          <a:lstStyle/>
+          <a:p/>
+          <a:p>
+            <a:pPr>
+              <a:defRPr sz="2400"/>
+            </a:pPr>
+            <a:r>
+              <a:t>Multilingual voice support</a:t>
+            </a:r>
+          </a:p>
+          <a:p>
+            <a:pPr>
+              <a:defRPr sz="2400"/>
+            </a:pPr>
+            <a:r>
+              <a:t>Integration with live insurance systems</a:t>
+            </a:r>
+          </a:p>
+          <a:p>
+            <a:pPr>
+              <a:defRPr sz="2400"/>
+            </a:pPr>
+            <a:r>
+              <a:t>Advanced analytics and reporting</a:t>
+            </a:r>
+          </a:p>
+          <a:p>
+            <a:pPr>
+              <a:defRPr sz="2400"/>
+            </a:pPr>
+            <a:r>
+              <a:t>Mobile app version</a:t>
+            </a:r>
+          </a:p>
+          <a:p>
+            <a:pPr>
+              <a:defRPr sz="2400"/>
+            </a:pPr>
+            <a:r>
+              <a:t>Continuous LLM improvement</a:t>
+            </a:r>
+          </a:p>
+        </p:txBody>
+      </p:sp>
+    </p:spTree>
+  </p:cSld>
+  <p:clrMapOvr>
+    <a:masterClrMapping/>
+  </p:clrMapOvr>
+</p:sld>
+</file>
+
+<file path=ppt/slides/slide15.xml><?xml version="1.0" encoding="utf-8"?>
+<p:sld xmlns:a="http://schemas.openxmlformats.org/drawingml/2006/main" xmlns:p="http://schemas.openxmlformats.org/presentationml/2006/main" xmlns:r="http://schemas.openxmlformats.org/officeDocument/2006/relationships">
+  <p:cSld>
+    <p:spTree>
+      <p:nvGrpSpPr>
+        <p:cNvPr id="1" name=""/>
+        <p:cNvGrpSpPr/>
+        <p:nvPr/>
+      </p:nvGrpSpPr>
+      <p:grpSpPr/>
+      <p:sp>
+        <p:nvSpPr>
+          <p:cNvPr id="2" name="Title 1"/>
+          <p:cNvSpPr>
+            <a:spLocks noGrp="1"/>
+          </p:cNvSpPr>
+          <p:nvPr>
+            <p:ph type="title"/>
+          </p:nvPr>
+        </p:nvSpPr>
+        <p:spPr/>
+        <p:txBody>
+          <a:bodyPr/>
+          <a:lstStyle/>
+          <a:p>
+            <a:r>
               <a:t>Hackathon Impact &amp; Closing</a:t>
             </a:r>
           </a:p>
@@ -3944,7 +4138,7 @@
           <a:lstStyle/>
           <a:p>
             <a:r>
-              <a:t>Detailed RAG Flow</a:t>
+              <a:t>[Diagram] High-Level Architecture</a:t>
             </a:r>
           </a:p>
         </p:txBody>
@@ -3963,45 +4157,94 @@
         <p:txBody>
           <a:bodyPr/>
           <a:lstStyle/>
-          <a:p/>
-          <a:p>
-            <a:pPr>
-              <a:defRPr sz="2400"/>
-            </a:pPr>
-            <a:r>
-              <a:t>User query received (text or voice)</a:t>
-            </a:r>
-          </a:p>
-          <a:p>
-            <a:pPr>
-              <a:defRPr sz="2400"/>
-            </a:pPr>
-            <a:r>
-              <a:t>Query embedded using Gemini/AI model</a:t>
-            </a:r>
-          </a:p>
-          <a:p>
-            <a:pPr>
-              <a:defRPr sz="2400"/>
-            </a:pPr>
-            <a:r>
-              <a:t>FAISS vector search retrieves relevant policy chunks</a:t>
-            </a:r>
-          </a:p>
-          <a:p>
-            <a:pPr>
-              <a:defRPr sz="2400"/>
-            </a:pPr>
-            <a:r>
-              <a:t>Context passed to LLM for grounded answer</a:t>
-            </a:r>
-          </a:p>
-          <a:p>
-            <a:pPr>
-              <a:defRPr sz="2400"/>
-            </a:pPr>
-            <a:r>
-              <a:t>Only document-backed responses returned</a:t>
+          <a:p>
+            <a:pPr algn="l">
+              <a:defRPr sz="1200">
+                <a:latin typeface="Courier New"/>
+              </a:defRPr>
+            </a:pPr>
+            <a:r>
+              <a:t>┌────────────────────────────────────────────────────────────────────────────┐</a:t>
+            </a:r>
+            <a:br/>
+            <a:r>
+              <a:t>│                    Entry Point                                            │</a:t>
+            </a:r>
+            <a:br/>
+            <a:r>
+              <a:t>│              RAGOrchestrator (Root Agent)                                 │</a:t>
+            </a:r>
+            <a:br/>
+            <a:r>
+              <a:t>│         - Intelligent Request Routing                                     │</a:t>
+            </a:r>
+            <a:br/>
+            <a:r>
+              <a:t>│         - Text Mode (_run_async_impl)                                     │</a:t>
+            </a:r>
+            <a:br/>
+            <a:r>
+              <a:t>│         - Voice Mode (_run_live_impl)                                     │</a:t>
+            </a:r>
+            <a:br/>
+            <a:r>
+              <a:t>└───────────────┬────────────────────────────────────────────────────────────┘</a:t>
+            </a:r>
+            <a:br/>
+            <a:r>
+              <a:t>                │</a:t>
+            </a:r>
+            <a:br/>
+            <a:r>
+              <a:t>    ┌───────────┼────────────┬────────────┐</a:t>
+            </a:r>
+            <a:br/>
+            <a:r>
+              <a:t>    │           │            │            │</a:t>
+            </a:r>
+            <a:br/>
+            <a:r>
+              <a:t>    v           v            v</a:t>
+            </a:r>
+            <a:br/>
+            <a:r>
+              <a:t>┌──────────┐ ┌───────────┐ ┌────────────┐</a:t>
+            </a:r>
+            <a:br/>
+            <a:r>
+              <a:t>│  Policy  │ │  Search   │ │   Voice    │</a:t>
+            </a:r>
+            <a:br/>
+            <a:r>
+              <a:t>│ Manager  │ │ Assistant │ │ Assistant  │</a:t>
+            </a:r>
+            <a:br/>
+            <a:r>
+              <a:t>│  Agent   │ │  Agent    │ │   Agent    │</a:t>
+            </a:r>
+            <a:br/>
+            <a:r>
+              <a:t>└─────┬────┘ └─────┬─────┘ └─────┬──────┘</a:t>
+            </a:r>
+            <a:br/>
+            <a:r>
+              <a:t>      v           v              v</a:t>
+            </a:r>
+            <a:br/>
+            <a:r>
+              <a:t>┌──────────┐ ┌───────────┐ ┌────────────┐</a:t>
+            </a:r>
+            <a:br/>
+            <a:r>
+              <a:t>│ Policy   │ │  Search   │ │   Voice    │</a:t>
+            </a:r>
+            <a:br/>
+            <a:r>
+              <a:t>│  Tools   │ │  Tools    │ │   Tools    │</a:t>
+            </a:r>
+            <a:br/>
+            <a:r>
+              <a:t>└──────────┘ └───────────┘ └────────────┘</a:t>
             </a:r>
           </a:p>
         </p:txBody>
@@ -4040,7 +4283,7 @@
           <a:lstStyle/>
           <a:p>
             <a:r>
-              <a:t>Voice Flow</a:t>
+              <a:t>Detailed RAG Flow</a:t>
             </a:r>
           </a:p>
         </p:txBody>
@@ -4065,39 +4308,39 @@
               <a:defRPr sz="2400"/>
             </a:pPr>
             <a:r>
-              <a:t>User speaks into browser mic</a:t>
-            </a:r>
-          </a:p>
-          <a:p>
-            <a:pPr>
-              <a:defRPr sz="2400"/>
-            </a:pPr>
-            <a:r>
-              <a:t>Speech-to-Text (STT) converts to text</a:t>
-            </a:r>
-          </a:p>
-          <a:p>
-            <a:pPr>
-              <a:defRPr sz="2400"/>
-            </a:pPr>
-            <a:r>
-              <a:t>Text sent to backend RAG pipeline</a:t>
-            </a:r>
-          </a:p>
-          <a:p>
-            <a:pPr>
-              <a:defRPr sz="2400"/>
-            </a:pPr>
-            <a:r>
-              <a:t>Answer generated and sent back</a:t>
-            </a:r>
-          </a:p>
-          <a:p>
-            <a:pPr>
-              <a:defRPr sz="2400"/>
-            </a:pPr>
-            <a:r>
-              <a:t>Text-to-Speech (TTS) reads answer aloud</a:t>
+              <a:t>User query received (text or voice)</a:t>
+            </a:r>
+          </a:p>
+          <a:p>
+            <a:pPr>
+              <a:defRPr sz="2400"/>
+            </a:pPr>
+            <a:r>
+              <a:t>Query embedded using Gemini/AI model</a:t>
+            </a:r>
+          </a:p>
+          <a:p>
+            <a:pPr>
+              <a:defRPr sz="2400"/>
+            </a:pPr>
+            <a:r>
+              <a:t>FAISS vector search retrieves relevant policy chunks</a:t>
+            </a:r>
+          </a:p>
+          <a:p>
+            <a:pPr>
+              <a:defRPr sz="2400"/>
+            </a:pPr>
+            <a:r>
+              <a:t>Context passed to LLM for grounded answer</a:t>
+            </a:r>
+          </a:p>
+          <a:p>
+            <a:pPr>
+              <a:defRPr sz="2400"/>
+            </a:pPr>
+            <a:r>
+              <a:t>Only document-backed responses returned</a:t>
             </a:r>
           </a:p>
         </p:txBody>
@@ -4136,7 +4379,7 @@
           <a:lstStyle/>
           <a:p>
             <a:r>
-              <a:t>No-Hallucination Strategy</a:t>
+              <a:t>[Diagram] System Flow Diagram</a:t>
             </a:r>
           </a:p>
         </p:txBody>
@@ -4155,45 +4398,190 @@
         <p:txBody>
           <a:bodyPr/>
           <a:lstStyle/>
-          <a:p/>
-          <a:p>
-            <a:pPr>
-              <a:defRPr sz="2400"/>
-            </a:pPr>
-            <a:r>
-              <a:t>Strict grounding: answers only from indexed documents</a:t>
-            </a:r>
-          </a:p>
-          <a:p>
-            <a:pPr>
-              <a:defRPr sz="2400"/>
-            </a:pPr>
-            <a:r>
-              <a:t>RAG pipeline enforces document context</a:t>
-            </a:r>
-          </a:p>
-          <a:p>
-            <a:pPr>
-              <a:defRPr sz="2400"/>
-            </a:pPr>
-            <a:r>
-              <a:t>No open-ended LLM responses</a:t>
-            </a:r>
-          </a:p>
-          <a:p>
-            <a:pPr>
-              <a:defRPr sz="2400"/>
-            </a:pPr>
-            <a:r>
-              <a:t>Policy snippets shown as evidence</a:t>
-            </a:r>
-          </a:p>
-          <a:p>
-            <a:pPr>
-              <a:defRPr sz="2400"/>
-            </a:pPr>
-            <a:r>
-              <a:t>User trust through transparency</a:t>
+          <a:p>
+            <a:pPr algn="l">
+              <a:defRPr sz="1200">
+                <a:latin typeface="Courier New"/>
+              </a:defRPr>
+            </a:pPr>
+            <a:r>
+              <a:t>┌────────────────────┐</a:t>
+            </a:r>
+            <a:br/>
+            <a:r>
+              <a:t>│   User Input       │</a:t>
+            </a:r>
+            <a:br/>
+            <a:r>
+              <a:t>│  (Text or Voice)   │</a:t>
+            </a:r>
+            <a:br/>
+            <a:r>
+              <a:t>└─────────┬──────────┘</a:t>
+            </a:r>
+            <a:br/>
+            <a:r>
+              <a:t>          v</a:t>
+            </a:r>
+            <a:br/>
+            <a:r>
+              <a:t>┌──────────────────────────────────────────────┐</a:t>
+            </a:r>
+            <a:br/>
+            <a:r>
+              <a:t>│         RAG Orchestrator                     │</a:t>
+            </a:r>
+            <a:br/>
+            <a:r>
+              <a:t>│  1. Extract text from context                │</a:t>
+            </a:r>
+            <a:br/>
+            <a:r>
+              <a:t>│  2. Determine route via keywords             │</a:t>
+            </a:r>
+            <a:br/>
+            <a:r>
+              <a:t>└─────────┬────────────────────────────────────┘</a:t>
+            </a:r>
+            <a:br/>
+            <a:r>
+              <a:t>          v</a:t>
+            </a:r>
+            <a:br/>
+            <a:r>
+              <a:t>    ┌────────────┐</a:t>
+            </a:r>
+            <a:br/>
+            <a:r>
+              <a:t>    │  Routing   │</a:t>
+            </a:r>
+            <a:br/>
+            <a:r>
+              <a:t>    │   Logic    │</a:t>
+            </a:r>
+            <a:br/>
+            <a:r>
+              <a:t>    └────┬───────┘</a:t>
+            </a:r>
+            <a:br/>
+            <a:r>
+              <a:t>         v</a:t>
+            </a:r>
+            <a:br/>
+            <a:r>
+              <a:t>  Keywords found?</a:t>
+            </a:r>
+            <a:br/>
+            <a:r>
+              <a:t>     │</a:t>
+            </a:r>
+            <a:br/>
+            <a:r>
+              <a:t> ┌───┴───┐</a:t>
+            </a:r>
+            <a:br/>
+            <a:r>
+              <a:t> │       │</a:t>
+            </a:r>
+            <a:br/>
+            <a:r>
+              <a:t> v       v</a:t>
+            </a:r>
+            <a:br/>
+            <a:r>
+              <a:t>Yes     No</a:t>
+            </a:r>
+            <a:br/>
+            <a:r>
+              <a:t> │       │</a:t>
+            </a:r>
+            <a:br/>
+            <a:r>
+              <a:t> v       v</a:t>
+            </a:r>
+            <a:br/>
+            <a:r>
+              <a:t>┌────────────┐   ┌───────────────┐</a:t>
+            </a:r>
+            <a:br/>
+            <a:r>
+              <a:t>│  Policy    │   │   Search      │</a:t>
+            </a:r>
+            <a:br/>
+            <a:r>
+              <a:t>│  Manager   │   │   Assistant   │</a:t>
+            </a:r>
+            <a:br/>
+            <a:r>
+              <a:t>│  Agent     │   │   Agent       │</a:t>
+            </a:r>
+            <a:br/>
+            <a:r>
+              <a:t>└────┬───────┘   └─────┬─────────┘</a:t>
+            </a:r>
+            <a:br/>
+            <a:r>
+              <a:t>     v                 v</a:t>
+            </a:r>
+            <a:br/>
+            <a:r>
+              <a:t>┌────────────┐   ┌───────────────┐</a:t>
+            </a:r>
+            <a:br/>
+            <a:r>
+              <a:t>│ List Files │   │  Search       │</a:t>
+            </a:r>
+            <a:br/>
+            <a:r>
+              <a:t>│   Tool     │   │  Documents    │</a:t>
+            </a:r>
+            <a:br/>
+            <a:r>
+              <a:t>└────┬───────┘   └─────┬─────────┘</a:t>
+            </a:r>
+            <a:br/>
+            <a:r>
+              <a:t>     v                 v</a:t>
+            </a:r>
+            <a:br/>
+            <a:r>
+              <a:t>┌────────────┐   ┌───────────────┐</a:t>
+            </a:r>
+            <a:br/>
+            <a:r>
+              <a:t>│  Return    │   │  Return       │</a:t>
+            </a:r>
+            <a:br/>
+            <a:r>
+              <a:t>│  Policy    │   │  Answer from  │</a:t>
+            </a:r>
+            <a:br/>
+            <a:r>
+              <a:t>│  List      │   │  Indexed Docs │</a:t>
+            </a:r>
+            <a:br/>
+            <a:r>
+              <a:t>└────┬───────┘   └─────┬─────────┘</a:t>
+            </a:r>
+            <a:br/>
+            <a:r>
+              <a:t>     v                 v</a:t>
+            </a:r>
+            <a:br/>
+            <a:r>
+              <a:t>        ┌───────────────┐</a:t>
+            </a:r>
+            <a:br/>
+            <a:r>
+              <a:t>        │ Response to   │</a:t>
+            </a:r>
+            <a:br/>
+            <a:r>
+              <a:t>        │ User          │</a:t>
+            </a:r>
+            <a:br/>
+            <a:r>
+              <a:t>        └───────────────┘</a:t>
             </a:r>
           </a:p>
         </p:txBody>
@@ -4232,7 +4620,7 @@
           <a:lstStyle/>
           <a:p>
             <a:r>
-              <a:t>Tech Stack</a:t>
+              <a:t>Voice Flow</a:t>
             </a:r>
           </a:p>
         </p:txBody>
@@ -4257,39 +4645,39 @@
               <a:defRPr sz="2400"/>
             </a:pPr>
             <a:r>
-              <a:t>Frontend: HTML, JS, Web Speech API</a:t>
-            </a:r>
-          </a:p>
-          <a:p>
-            <a:pPr>
-              <a:defRPr sz="2400"/>
-            </a:pPr>
-            <a:r>
-              <a:t>Backend: FastAPI (Python), Flask (optional)</a:t>
-            </a:r>
-          </a:p>
-          <a:p>
-            <a:pPr>
-              <a:defRPr sz="2400"/>
-            </a:pPr>
-            <a:r>
-              <a:t>AI: Google ADK, Gemini models</a:t>
-            </a:r>
-          </a:p>
-          <a:p>
-            <a:pPr>
-              <a:defRPr sz="2400"/>
-            </a:pPr>
-            <a:r>
-              <a:t>Vector DB: FAISS</a:t>
-            </a:r>
-          </a:p>
-          <a:p>
-            <a:pPr>
-              <a:defRPr sz="2400"/>
-            </a:pPr>
-            <a:r>
-              <a:t>Infra: Local or cloud deployable</a:t>
+              <a:t>User speaks into browser mic</a:t>
+            </a:r>
+          </a:p>
+          <a:p>
+            <a:pPr>
+              <a:defRPr sz="2400"/>
+            </a:pPr>
+            <a:r>
+              <a:t>Speech-to-Text (STT) converts to text</a:t>
+            </a:r>
+          </a:p>
+          <a:p>
+            <a:pPr>
+              <a:defRPr sz="2400"/>
+            </a:pPr>
+            <a:r>
+              <a:t>Text sent to backend RAG pipeline</a:t>
+            </a:r>
+          </a:p>
+          <a:p>
+            <a:pPr>
+              <a:defRPr sz="2400"/>
+            </a:pPr>
+            <a:r>
+              <a:t>Answer generated and sent back</a:t>
+            </a:r>
+          </a:p>
+          <a:p>
+            <a:pPr>
+              <a:defRPr sz="2400"/>
+            </a:pPr>
+            <a:r>
+              <a:t>Text-to-Speech (TTS) reads answer aloud</a:t>
             </a:r>
           </a:p>
         </p:txBody>

</xml_diff>

<commit_message>
Update PPT: add images and technical/business explanations
</commit_message>
<xml_diff>
--- a/VoiceAgent_Hackathon_Presentation.pptx
+++ b/VoiceAgent_Hackathon_Presentation.pptx
@@ -20,6 +20,7 @@
     <p:sldId id="268" r:id="rId19"/>
     <p:sldId id="269" r:id="rId20"/>
     <p:sldId id="270" r:id="rId21"/>
+    <p:sldId id="271" r:id="rId22"/>
   </p:sldIdLst>
   <p:sldSz cx="9144000" cy="6858000" type="screen4x3"/>
   <p:notesSz cx="6858000" cy="9144000"/>
@@ -3274,7 +3275,7 @@
           <a:lstStyle/>
           <a:p>
             <a:r>
-              <a:t>Tech Stack</a:t>
+              <a:t>Tech Stack: Why These Choices?</a:t>
             </a:r>
           </a:p>
         </p:txBody>
@@ -3293,45 +3294,79 @@
         <p:txBody>
           <a:bodyPr/>
           <a:lstStyle/>
+          <a:p>
+            <a:r>
+              <a:t>• FastAPI: High-performance, async Python web framework.</a:t>
+            </a:r>
+          </a:p>
+          <a:p>
+            <a:r>
+              <a:t>  - Technical: Enables fast, scalable APIs for real-time RAG and voice.</a:t>
+            </a:r>
+          </a:p>
+          <a:p>
+            <a:r>
+              <a:t>  - Business: Reduces latency, improves user experience.</a:t>
+            </a:r>
+          </a:p>
           <a:p/>
-          <a:p>
-            <a:pPr>
-              <a:defRPr sz="2400"/>
-            </a:pPr>
-            <a:r>
-              <a:t>Frontend: HTML, JS, Web Speech API</a:t>
-            </a:r>
-          </a:p>
-          <a:p>
-            <a:pPr>
-              <a:defRPr sz="2400"/>
-            </a:pPr>
-            <a:r>
-              <a:t>Backend: FastAPI (Python), Flask (optional)</a:t>
-            </a:r>
-          </a:p>
-          <a:p>
-            <a:pPr>
-              <a:defRPr sz="2400"/>
-            </a:pPr>
-            <a:r>
-              <a:t>AI: Google ADK, Gemini models</a:t>
-            </a:r>
-          </a:p>
-          <a:p>
-            <a:pPr>
-              <a:defRPr sz="2400"/>
-            </a:pPr>
-            <a:r>
-              <a:t>Vector DB: FAISS</a:t>
-            </a:r>
-          </a:p>
-          <a:p>
-            <a:pPr>
-              <a:defRPr sz="2400"/>
-            </a:pPr>
-            <a:r>
-              <a:t>Infra: Local or cloud deployable</a:t>
+          <a:p/>
+          <a:p>
+            <a:r>
+              <a:t>• FAISS: Facebook AI Similarity Search.</a:t>
+            </a:r>
+            <a:br/>
+            <a:r>
+              <a:t>  - Technical: Efficient vector search for large policy docs.</a:t>
+            </a:r>
+            <a:br/>
+            <a:r>
+              <a:t>  - Business: Enables instant, accurate retrieval, scales to enterprise data.</a:t>
+            </a:r>
+            <a:br/>
+            <a:br/>
+          </a:p>
+          <a:p>
+            <a:r>
+              <a:t>• Google ADK &amp; Gemini: Advanced LLM and agent orchestration.</a:t>
+            </a:r>
+            <a:br/>
+            <a:r>
+              <a:t>  - Technical: State-of-the-art language understanding and agent routing.</a:t>
+            </a:r>
+            <a:br/>
+            <a:r>
+              <a:t>  - Business: Reduces hallucination, increases trust, future-proofs solution.</a:t>
+            </a:r>
+            <a:br/>
+            <a:br/>
+          </a:p>
+          <a:p>
+            <a:r>
+              <a:t>• python-pptx: Automated PPT generation.</a:t>
+            </a:r>
+            <a:br/>
+            <a:r>
+              <a:t>  - Technical: Enables hackathon-speed, repeatable slide creation.</a:t>
+            </a:r>
+            <a:br/>
+            <a:r>
+              <a:t>  - Business: Saves time, ensures consistency for demos.</a:t>
+            </a:r>
+            <a:br/>
+            <a:br/>
+          </a:p>
+          <a:p>
+            <a:r>
+              <a:t>• Web Speech API: Browser-based STT/TTS.</a:t>
+            </a:r>
+            <a:br/>
+            <a:r>
+              <a:t>  - Technical: Seamless voice input/output in any browser.</a:t>
+            </a:r>
+            <a:br/>
+            <a:r>
+              <a:t>  - Business: No install, accessible to all users.</a:t>
             </a:r>
           </a:p>
         </p:txBody>
@@ -3728,6 +3763,86 @@
 </p:sld>
 </file>
 
+<file path=ppt/slides/slide16.xml><?xml version="1.0" encoding="utf-8"?>
+<p:sld xmlns:a="http://schemas.openxmlformats.org/drawingml/2006/main" xmlns:p="http://schemas.openxmlformats.org/presentationml/2006/main" xmlns:r="http://schemas.openxmlformats.org/officeDocument/2006/relationships">
+  <p:cSld>
+    <p:spTree>
+      <p:nvGrpSpPr>
+        <p:cNvPr id="1" name=""/>
+        <p:cNvGrpSpPr/>
+        <p:nvPr/>
+      </p:nvGrpSpPr>
+      <p:grpSpPr/>
+      <p:sp>
+        <p:nvSpPr>
+          <p:cNvPr id="2" name="Title 1"/>
+          <p:cNvSpPr>
+            <a:spLocks noGrp="1"/>
+          </p:cNvSpPr>
+          <p:nvPr>
+            <p:ph type="title"/>
+          </p:nvPr>
+        </p:nvSpPr>
+        <p:spPr/>
+        <p:txBody>
+          <a:bodyPr/>
+          <a:lstStyle/>
+          <a:p>
+            <a:r>
+              <a:t>Business Value &amp; Impact</a:t>
+            </a:r>
+          </a:p>
+        </p:txBody>
+      </p:sp>
+      <p:sp>
+        <p:nvSpPr>
+          <p:cNvPr id="3" name="Content Placeholder 2"/>
+          <p:cNvSpPr>
+            <a:spLocks noGrp="1"/>
+          </p:cNvSpPr>
+          <p:nvPr>
+            <p:ph idx="1"/>
+          </p:nvPr>
+        </p:nvSpPr>
+        <p:spPr/>
+        <p:txBody>
+          <a:bodyPr/>
+          <a:lstStyle/>
+          <a:p>
+            <a:r>
+              <a:t>• Reduces customer confusion and support costs</a:t>
+            </a:r>
+          </a:p>
+          <a:p>
+            <a:r>
+              <a:t>• Increases policyholder satisfaction and trust</a:t>
+            </a:r>
+          </a:p>
+          <a:p>
+            <a:r>
+              <a:t>• Scalable to any insurance product or region</a:t>
+            </a:r>
+          </a:p>
+          <a:p>
+            <a:r>
+              <a:t>• Voice-first: accessible to all, including non-technical users</a:t>
+            </a:r>
+          </a:p>
+          <a:p>
+            <a:r>
+              <a:t>• Ready for enterprise deployment and future enhancements</a:t>
+            </a:r>
+          </a:p>
+        </p:txBody>
+      </p:sp>
+    </p:spTree>
+  </p:cSld>
+  <p:clrMapOvr>
+    <a:masterClrMapping/>
+  </p:clrMapOvr>
+</p:sld>
+</file>
+
 <file path=ppt/slides/slide2.xml><?xml version="1.0" encoding="utf-8"?>
 <p:sld xmlns:a="http://schemas.openxmlformats.org/drawingml/2006/main" xmlns:p="http://schemas.openxmlformats.org/presentationml/2006/main" xmlns:r="http://schemas.openxmlformats.org/officeDocument/2006/relationships">
   <p:cSld>
@@ -4047,63 +4162,30 @@
           </a:p>
         </p:txBody>
       </p:sp>
-      <p:sp>
-        <p:nvSpPr>
-          <p:cNvPr id="3" name="Content Placeholder 2"/>
-          <p:cNvSpPr>
-            <a:spLocks noGrp="1"/>
-          </p:cNvSpPr>
-          <p:nvPr>
-            <p:ph idx="1"/>
-          </p:nvPr>
-        </p:nvSpPr>
-        <p:spPr/>
-        <p:txBody>
-          <a:bodyPr/>
-          <a:lstStyle/>
-          <a:p/>
-          <a:p>
-            <a:pPr>
-              <a:defRPr sz="2400"/>
-            </a:pPr>
-            <a:r>
-              <a:t>Frontend: Browser UI with Speech-to-Text &amp; Text-to-Speech</a:t>
-            </a:r>
-          </a:p>
-          <a:p>
-            <a:pPr>
-              <a:defRPr sz="2400"/>
-            </a:pPr>
-            <a:r>
-              <a:t>Backend: FastAPI orchestrates RAG and voice flows</a:t>
-            </a:r>
-          </a:p>
-          <a:p>
-            <a:pPr>
-              <a:defRPr sz="2400"/>
-            </a:pPr>
-            <a:r>
-              <a:t>AI: Google ADK Agents + Gemini LLMs</a:t>
-            </a:r>
-          </a:p>
-          <a:p>
-            <a:pPr>
-              <a:defRPr sz="2400"/>
-            </a:pPr>
-            <a:r>
-              <a:t>Vector DB: FAISS for fast, semantic document search</a:t>
-            </a:r>
-          </a:p>
-          <a:p>
-            <a:pPr>
-              <a:defRPr sz="2400"/>
-            </a:pPr>
-            <a:r>
-              <a:t>Modular, scalable, and cloud-ready</a:t>
-            </a:r>
-          </a:p>
-        </p:txBody>
-      </p:sp>
+      <p:pic>
+        <p:nvPicPr>
+          <p:cNvPr id="3" name="Picture 2" descr="RAGOrchestrator Agent Tool-architrecture.png"/>
+          <p:cNvPicPr>
+            <a:picLocks noChangeAspect="1"/>
+          </p:cNvPicPr>
+          <p:nvPr/>
+        </p:nvPicPr>
+        <p:blipFill>
+          <a:blip r:embed="rId2"/>
+          <a:stretch>
+            <a:fillRect/>
+          </a:stretch>
+        </p:blipFill>
+        <p:spPr>
+          <a:xfrm>
+            <a:off x="914400" y="1371600"/>
+            <a:ext cx="6400800" cy="2935804"/>
+          </a:xfrm>
+          <a:prstGeom prst="rect">
+            <a:avLst/>
+          </a:prstGeom>
+        </p:spPr>
+      </p:pic>
     </p:spTree>
   </p:cSld>
   <p:clrMapOvr>
@@ -4143,112 +4225,30 @@
           </a:p>
         </p:txBody>
       </p:sp>
-      <p:sp>
-        <p:nvSpPr>
-          <p:cNvPr id="3" name="Content Placeholder 2"/>
-          <p:cNvSpPr>
-            <a:spLocks noGrp="1"/>
-          </p:cNvSpPr>
-          <p:nvPr>
-            <p:ph idx="1"/>
-          </p:nvPr>
-        </p:nvSpPr>
-        <p:spPr/>
-        <p:txBody>
-          <a:bodyPr/>
-          <a:lstStyle/>
-          <a:p>
-            <a:pPr algn="l">
-              <a:defRPr sz="1200">
-                <a:latin typeface="Courier New"/>
-              </a:defRPr>
-            </a:pPr>
-            <a:r>
-              <a:t>┌────────────────────────────────────────────────────────────────────────────┐</a:t>
-            </a:r>
-            <a:br/>
-            <a:r>
-              <a:t>│                    Entry Point                                            │</a:t>
-            </a:r>
-            <a:br/>
-            <a:r>
-              <a:t>│              RAGOrchestrator (Root Agent)                                 │</a:t>
-            </a:r>
-            <a:br/>
-            <a:r>
-              <a:t>│         - Intelligent Request Routing                                     │</a:t>
-            </a:r>
-            <a:br/>
-            <a:r>
-              <a:t>│         - Text Mode (_run_async_impl)                                     │</a:t>
-            </a:r>
-            <a:br/>
-            <a:r>
-              <a:t>│         - Voice Mode (_run_live_impl)                                     │</a:t>
-            </a:r>
-            <a:br/>
-            <a:r>
-              <a:t>└───────────────┬────────────────────────────────────────────────────────────┘</a:t>
-            </a:r>
-            <a:br/>
-            <a:r>
-              <a:t>                │</a:t>
-            </a:r>
-            <a:br/>
-            <a:r>
-              <a:t>    ┌───────────┼────────────┬────────────┐</a:t>
-            </a:r>
-            <a:br/>
-            <a:r>
-              <a:t>    │           │            │            │</a:t>
-            </a:r>
-            <a:br/>
-            <a:r>
-              <a:t>    v           v            v</a:t>
-            </a:r>
-            <a:br/>
-            <a:r>
-              <a:t>┌──────────┐ ┌───────────┐ ┌────────────┐</a:t>
-            </a:r>
-            <a:br/>
-            <a:r>
-              <a:t>│  Policy  │ │  Search   │ │   Voice    │</a:t>
-            </a:r>
-            <a:br/>
-            <a:r>
-              <a:t>│ Manager  │ │ Assistant │ │ Assistant  │</a:t>
-            </a:r>
-            <a:br/>
-            <a:r>
-              <a:t>│  Agent   │ │  Agent    │ │   Agent    │</a:t>
-            </a:r>
-            <a:br/>
-            <a:r>
-              <a:t>└─────┬────┘ └─────┬─────┘ └─────┬──────┘</a:t>
-            </a:r>
-            <a:br/>
-            <a:r>
-              <a:t>      v           v              v</a:t>
-            </a:r>
-            <a:br/>
-            <a:r>
-              <a:t>┌──────────┐ ┌───────────┐ ┌────────────┐</a:t>
-            </a:r>
-            <a:br/>
-            <a:r>
-              <a:t>│ Policy   │ │  Search   │ │   Voice    │</a:t>
-            </a:r>
-            <a:br/>
-            <a:r>
-              <a:t>│  Tools   │ │  Tools    │ │   Tools    │</a:t>
-            </a:r>
-            <a:br/>
-            <a:r>
-              <a:t>└──────────┘ └───────────┘ └────────────┘</a:t>
-            </a:r>
-          </a:p>
-        </p:txBody>
-      </p:sp>
+      <p:pic>
+        <p:nvPicPr>
+          <p:cNvPr id="3" name="Picture 2" descr="RAGOrchestrator Agent Tool-architrecture.png"/>
+          <p:cNvPicPr>
+            <a:picLocks noChangeAspect="1"/>
+          </p:cNvPicPr>
+          <p:nvPr/>
+        </p:nvPicPr>
+        <p:blipFill>
+          <a:blip r:embed="rId2"/>
+          <a:stretch>
+            <a:fillRect/>
+          </a:stretch>
+        </p:blipFill>
+        <p:spPr>
+          <a:xfrm>
+            <a:off x="914400" y="1371600"/>
+            <a:ext cx="6400800" cy="2935804"/>
+          </a:xfrm>
+          <a:prstGeom prst="rect">
+            <a:avLst/>
+          </a:prstGeom>
+        </p:spPr>
+      </p:pic>
     </p:spTree>
   </p:cSld>
   <p:clrMapOvr>
@@ -4384,208 +4384,30 @@
           </a:p>
         </p:txBody>
       </p:sp>
-      <p:sp>
-        <p:nvSpPr>
-          <p:cNvPr id="3" name="Content Placeholder 2"/>
-          <p:cNvSpPr>
-            <a:spLocks noGrp="1"/>
-          </p:cNvSpPr>
-          <p:nvPr>
-            <p:ph idx="1"/>
-          </p:nvPr>
-        </p:nvSpPr>
-        <p:spPr/>
-        <p:txBody>
-          <a:bodyPr/>
-          <a:lstStyle/>
-          <a:p>
-            <a:pPr algn="l">
-              <a:defRPr sz="1200">
-                <a:latin typeface="Courier New"/>
-              </a:defRPr>
-            </a:pPr>
-            <a:r>
-              <a:t>┌────────────────────┐</a:t>
-            </a:r>
-            <a:br/>
-            <a:r>
-              <a:t>│   User Input       │</a:t>
-            </a:r>
-            <a:br/>
-            <a:r>
-              <a:t>│  (Text or Voice)   │</a:t>
-            </a:r>
-            <a:br/>
-            <a:r>
-              <a:t>└─────────┬──────────┘</a:t>
-            </a:r>
-            <a:br/>
-            <a:r>
-              <a:t>          v</a:t>
-            </a:r>
-            <a:br/>
-            <a:r>
-              <a:t>┌──────────────────────────────────────────────┐</a:t>
-            </a:r>
-            <a:br/>
-            <a:r>
-              <a:t>│         RAG Orchestrator                     │</a:t>
-            </a:r>
-            <a:br/>
-            <a:r>
-              <a:t>│  1. Extract text from context                │</a:t>
-            </a:r>
-            <a:br/>
-            <a:r>
-              <a:t>│  2. Determine route via keywords             │</a:t>
-            </a:r>
-            <a:br/>
-            <a:r>
-              <a:t>└─────────┬────────────────────────────────────┘</a:t>
-            </a:r>
-            <a:br/>
-            <a:r>
-              <a:t>          v</a:t>
-            </a:r>
-            <a:br/>
-            <a:r>
-              <a:t>    ┌────────────┐</a:t>
-            </a:r>
-            <a:br/>
-            <a:r>
-              <a:t>    │  Routing   │</a:t>
-            </a:r>
-            <a:br/>
-            <a:r>
-              <a:t>    │   Logic    │</a:t>
-            </a:r>
-            <a:br/>
-            <a:r>
-              <a:t>    └────┬───────┘</a:t>
-            </a:r>
-            <a:br/>
-            <a:r>
-              <a:t>         v</a:t>
-            </a:r>
-            <a:br/>
-            <a:r>
-              <a:t>  Keywords found?</a:t>
-            </a:r>
-            <a:br/>
-            <a:r>
-              <a:t>     │</a:t>
-            </a:r>
-            <a:br/>
-            <a:r>
-              <a:t> ┌───┴───┐</a:t>
-            </a:r>
-            <a:br/>
-            <a:r>
-              <a:t> │       │</a:t>
-            </a:r>
-            <a:br/>
-            <a:r>
-              <a:t> v       v</a:t>
-            </a:r>
-            <a:br/>
-            <a:r>
-              <a:t>Yes     No</a:t>
-            </a:r>
-            <a:br/>
-            <a:r>
-              <a:t> │       │</a:t>
-            </a:r>
-            <a:br/>
-            <a:r>
-              <a:t> v       v</a:t>
-            </a:r>
-            <a:br/>
-            <a:r>
-              <a:t>┌────────────┐   ┌───────────────┐</a:t>
-            </a:r>
-            <a:br/>
-            <a:r>
-              <a:t>│  Policy    │   │   Search      │</a:t>
-            </a:r>
-            <a:br/>
-            <a:r>
-              <a:t>│  Manager   │   │   Assistant   │</a:t>
-            </a:r>
-            <a:br/>
-            <a:r>
-              <a:t>│  Agent     │   │   Agent       │</a:t>
-            </a:r>
-            <a:br/>
-            <a:r>
-              <a:t>└────┬───────┘   └─────┬─────────┘</a:t>
-            </a:r>
-            <a:br/>
-            <a:r>
-              <a:t>     v                 v</a:t>
-            </a:r>
-            <a:br/>
-            <a:r>
-              <a:t>┌────────────┐   ┌───────────────┐</a:t>
-            </a:r>
-            <a:br/>
-            <a:r>
-              <a:t>│ List Files │   │  Search       │</a:t>
-            </a:r>
-            <a:br/>
-            <a:r>
-              <a:t>│   Tool     │   │  Documents    │</a:t>
-            </a:r>
-            <a:br/>
-            <a:r>
-              <a:t>└────┬───────┘   └─────┬─────────┘</a:t>
-            </a:r>
-            <a:br/>
-            <a:r>
-              <a:t>     v                 v</a:t>
-            </a:r>
-            <a:br/>
-            <a:r>
-              <a:t>┌────────────┐   ┌───────────────┐</a:t>
-            </a:r>
-            <a:br/>
-            <a:r>
-              <a:t>│  Return    │   │  Return       │</a:t>
-            </a:r>
-            <a:br/>
-            <a:r>
-              <a:t>│  Policy    │   │  Answer from  │</a:t>
-            </a:r>
-            <a:br/>
-            <a:r>
-              <a:t>│  List      │   │  Indexed Docs │</a:t>
-            </a:r>
-            <a:br/>
-            <a:r>
-              <a:t>└────┬───────┘   └─────┬─────────┘</a:t>
-            </a:r>
-            <a:br/>
-            <a:r>
-              <a:t>     v                 v</a:t>
-            </a:r>
-            <a:br/>
-            <a:r>
-              <a:t>        ┌───────────────┐</a:t>
-            </a:r>
-            <a:br/>
-            <a:r>
-              <a:t>        │ Response to   │</a:t>
-            </a:r>
-            <a:br/>
-            <a:r>
-              <a:t>        │ User          │</a:t>
-            </a:r>
-            <a:br/>
-            <a:r>
-              <a:t>        └───────────────┘</a:t>
-            </a:r>
-          </a:p>
-        </p:txBody>
-      </p:sp>
+      <p:pic>
+        <p:nvPicPr>
+          <p:cNvPr id="3" name="Picture 2" descr="RAGOrchestrator Agent Tool-flow-diagram.png"/>
+          <p:cNvPicPr>
+            <a:picLocks noChangeAspect="1"/>
+          </p:cNvPicPr>
+          <p:nvPr/>
+        </p:nvPicPr>
+        <p:blipFill>
+          <a:blip r:embed="rId2"/>
+          <a:stretch>
+            <a:fillRect/>
+          </a:stretch>
+        </p:blipFill>
+        <p:spPr>
+          <a:xfrm>
+            <a:off x="914400" y="1371600"/>
+            <a:ext cx="6400800" cy="13521038"/>
+          </a:xfrm>
+          <a:prstGeom prst="rect">
+            <a:avLst/>
+          </a:prstGeom>
+        </p:spPr>
+      </p:pic>
     </p:spTree>
   </p:cSld>
   <p:clrMapOvr>

</xml_diff>